<commit_message>
Site updated: 2021-01-19 22:13:40
</commit_message>
<xml_diff>
--- a/img/pyli.pptx
+++ b/img/pyli.pptx
@@ -3612,8 +3612,8 @@
         </p:nvSpPr>
         <p:spPr>
           <a:xfrm rot="8100000" flipV="1">
-            <a:off x="2175446" y="3820778"/>
-            <a:ext cx="1255181" cy="306364"/>
+            <a:off x="2250658" y="3789623"/>
+            <a:ext cx="1255181" cy="519098"/>
           </a:xfrm>
           <a:prstGeom prst="round2DiagRect">
             <a:avLst>

</xml_diff>

<commit_message>
Site updated: 2021-01-21 12:51:03
</commit_message>
<xml_diff>
--- a/img/pyli.pptx
+++ b/img/pyli.pptx
@@ -259,7 +259,7 @@
           <a:p>
             <a:fld id="{FC1DA73A-530B-4180-8B42-735A1C2745EE}" type="datetimeFigureOut">
               <a:rPr lang="zh-CN" altLang="en-US" smtClean="0"/>
-              <a:t>2021/1/19</a:t>
+              <a:t>2021/1/21</a:t>
             </a:fld>
             <a:endParaRPr lang="zh-CN" altLang="en-US"/>
           </a:p>
@@ -457,7 +457,7 @@
           <a:p>
             <a:fld id="{FC1DA73A-530B-4180-8B42-735A1C2745EE}" type="datetimeFigureOut">
               <a:rPr lang="zh-CN" altLang="en-US" smtClean="0"/>
-              <a:t>2021/1/19</a:t>
+              <a:t>2021/1/21</a:t>
             </a:fld>
             <a:endParaRPr lang="zh-CN" altLang="en-US"/>
           </a:p>
@@ -665,7 +665,7 @@
           <a:p>
             <a:fld id="{FC1DA73A-530B-4180-8B42-735A1C2745EE}" type="datetimeFigureOut">
               <a:rPr lang="zh-CN" altLang="en-US" smtClean="0"/>
-              <a:t>2021/1/19</a:t>
+              <a:t>2021/1/21</a:t>
             </a:fld>
             <a:endParaRPr lang="zh-CN" altLang="en-US"/>
           </a:p>
@@ -863,7 +863,7 @@
           <a:p>
             <a:fld id="{FC1DA73A-530B-4180-8B42-735A1C2745EE}" type="datetimeFigureOut">
               <a:rPr lang="zh-CN" altLang="en-US" smtClean="0"/>
-              <a:t>2021/1/19</a:t>
+              <a:t>2021/1/21</a:t>
             </a:fld>
             <a:endParaRPr lang="zh-CN" altLang="en-US"/>
           </a:p>
@@ -1138,7 +1138,7 @@
           <a:p>
             <a:fld id="{FC1DA73A-530B-4180-8B42-735A1C2745EE}" type="datetimeFigureOut">
               <a:rPr lang="zh-CN" altLang="en-US" smtClean="0"/>
-              <a:t>2021/1/19</a:t>
+              <a:t>2021/1/21</a:t>
             </a:fld>
             <a:endParaRPr lang="zh-CN" altLang="en-US"/>
           </a:p>
@@ -1403,7 +1403,7 @@
           <a:p>
             <a:fld id="{FC1DA73A-530B-4180-8B42-735A1C2745EE}" type="datetimeFigureOut">
               <a:rPr lang="zh-CN" altLang="en-US" smtClean="0"/>
-              <a:t>2021/1/19</a:t>
+              <a:t>2021/1/21</a:t>
             </a:fld>
             <a:endParaRPr lang="zh-CN" altLang="en-US"/>
           </a:p>
@@ -1815,7 +1815,7 @@
           <a:p>
             <a:fld id="{FC1DA73A-530B-4180-8B42-735A1C2745EE}" type="datetimeFigureOut">
               <a:rPr lang="zh-CN" altLang="en-US" smtClean="0"/>
-              <a:t>2021/1/19</a:t>
+              <a:t>2021/1/21</a:t>
             </a:fld>
             <a:endParaRPr lang="zh-CN" altLang="en-US"/>
           </a:p>
@@ -1956,7 +1956,7 @@
           <a:p>
             <a:fld id="{FC1DA73A-530B-4180-8B42-735A1C2745EE}" type="datetimeFigureOut">
               <a:rPr lang="zh-CN" altLang="en-US" smtClean="0"/>
-              <a:t>2021/1/19</a:t>
+              <a:t>2021/1/21</a:t>
             </a:fld>
             <a:endParaRPr lang="zh-CN" altLang="en-US"/>
           </a:p>
@@ -2069,7 +2069,7 @@
           <a:p>
             <a:fld id="{FC1DA73A-530B-4180-8B42-735A1C2745EE}" type="datetimeFigureOut">
               <a:rPr lang="zh-CN" altLang="en-US" smtClean="0"/>
-              <a:t>2021/1/19</a:t>
+              <a:t>2021/1/21</a:t>
             </a:fld>
             <a:endParaRPr lang="zh-CN" altLang="en-US"/>
           </a:p>
@@ -2380,7 +2380,7 @@
           <a:p>
             <a:fld id="{FC1DA73A-530B-4180-8B42-735A1C2745EE}" type="datetimeFigureOut">
               <a:rPr lang="zh-CN" altLang="en-US" smtClean="0"/>
-              <a:t>2021/1/19</a:t>
+              <a:t>2021/1/21</a:t>
             </a:fld>
             <a:endParaRPr lang="zh-CN" altLang="en-US"/>
           </a:p>
@@ -2668,7 +2668,7 @@
           <a:p>
             <a:fld id="{FC1DA73A-530B-4180-8B42-735A1C2745EE}" type="datetimeFigureOut">
               <a:rPr lang="zh-CN" altLang="en-US" smtClean="0"/>
-              <a:t>2021/1/19</a:t>
+              <a:t>2021/1/21</a:t>
             </a:fld>
             <a:endParaRPr lang="zh-CN" altLang="en-US"/>
           </a:p>
@@ -2909,7 +2909,7 @@
           <a:p>
             <a:fld id="{FC1DA73A-530B-4180-8B42-735A1C2745EE}" type="datetimeFigureOut">
               <a:rPr lang="zh-CN" altLang="en-US" smtClean="0"/>
-              <a:t>2021/1/19</a:t>
+              <a:t>2021/1/21</a:t>
             </a:fld>
             <a:endParaRPr lang="zh-CN" altLang="en-US"/>
           </a:p>
@@ -3570,8 +3570,8 @@
         </p:nvSpPr>
         <p:spPr>
           <a:xfrm>
-            <a:off x="6598341" y="1997839"/>
-            <a:ext cx="7026282" cy="2862322"/>
+            <a:off x="7017929" y="1228397"/>
+            <a:ext cx="10851459" cy="4401205"/>
           </a:xfrm>
           <a:prstGeom prst="rect">
             <a:avLst/>
@@ -3585,13 +3585,13 @@
           <a:lstStyle/>
           <a:p>
             <a:r>
-              <a:rPr lang="en-US" altLang="zh-CN" sz="18000" dirty="0">
+              <a:rPr lang="en-US" altLang="zh-CN" sz="28000" dirty="0">
                 <a:latin typeface="Eurostile ExtendedTwo" panose="020B0507020202060204" pitchFamily="34" charset="0"/>
                 <a:ea typeface="Microsoft JhengHei UI Light" panose="020B0304030504040204" pitchFamily="34" charset="-120"/>
               </a:rPr>
               <a:t>PYLI</a:t>
             </a:r>
-            <a:endParaRPr lang="zh-CN" altLang="en-US" sz="18000" dirty="0">
+            <a:endParaRPr lang="zh-CN" altLang="en-US" sz="28000" dirty="0">
               <a:latin typeface="Eurostile ExtendedTwo" panose="020B0507020202060204" pitchFamily="34" charset="0"/>
               <a:ea typeface="Microsoft JhengHei UI Light" panose="020B0304030504040204" pitchFamily="34" charset="-120"/>
             </a:endParaRPr>

</xml_diff>

<commit_message>
Site updated: 2021-01-21 16:48:53
</commit_message>
<xml_diff>
--- a/img/pyli.pptx
+++ b/img/pyli.pptx
@@ -3570,8 +3570,8 @@
         </p:nvSpPr>
         <p:spPr>
           <a:xfrm>
-            <a:off x="7017929" y="1228397"/>
-            <a:ext cx="10851459" cy="4401205"/>
+            <a:off x="6775971" y="1228397"/>
+            <a:ext cx="6816058" cy="4401205"/>
           </a:xfrm>
           <a:prstGeom prst="rect">
             <a:avLst/>
@@ -3586,14 +3586,14 @@
           <a:p>
             <a:r>
               <a:rPr lang="en-US" altLang="zh-CN" sz="28000" dirty="0">
-                <a:latin typeface="Eurostile ExtendedTwo" panose="020B0507020202060204" pitchFamily="34" charset="0"/>
-                <a:ea typeface="Microsoft JhengHei UI Light" panose="020B0304030504040204" pitchFamily="34" charset="-120"/>
+                <a:latin typeface="Candara Light" panose="020E0502030303020204" pitchFamily="34" charset="0"/>
+                <a:ea typeface="微软雅黑 Light" panose="020B0502040204020203" pitchFamily="34" charset="-122"/>
               </a:rPr>
               <a:t>PYLI</a:t>
             </a:r>
             <a:endParaRPr lang="zh-CN" altLang="en-US" sz="28000" dirty="0">
-              <a:latin typeface="Eurostile ExtendedTwo" panose="020B0507020202060204" pitchFamily="34" charset="0"/>
-              <a:ea typeface="Microsoft JhengHei UI Light" panose="020B0304030504040204" pitchFamily="34" charset="-120"/>
+              <a:latin typeface="Candara Light" panose="020E0502030303020204" pitchFamily="34" charset="0"/>
+              <a:ea typeface="微软雅黑 Light" panose="020B0502040204020203" pitchFamily="34" charset="-122"/>
             </a:endParaRPr>
           </a:p>
         </p:txBody>

</xml_diff>

<commit_message>
Site updated: 2021-02-02 15:59:30
</commit_message>
<xml_diff>
--- a/img/pyli.pptx
+++ b/img/pyli.pptx
@@ -259,7 +259,7 @@
           <a:p>
             <a:fld id="{FC1DA73A-530B-4180-8B42-735A1C2745EE}" type="datetimeFigureOut">
               <a:rPr lang="zh-CN" altLang="en-US" smtClean="0"/>
-              <a:t>2021/1/21</a:t>
+              <a:t>2021/2/2</a:t>
             </a:fld>
             <a:endParaRPr lang="zh-CN" altLang="en-US"/>
           </a:p>
@@ -457,7 +457,7 @@
           <a:p>
             <a:fld id="{FC1DA73A-530B-4180-8B42-735A1C2745EE}" type="datetimeFigureOut">
               <a:rPr lang="zh-CN" altLang="en-US" smtClean="0"/>
-              <a:t>2021/1/21</a:t>
+              <a:t>2021/2/2</a:t>
             </a:fld>
             <a:endParaRPr lang="zh-CN" altLang="en-US"/>
           </a:p>
@@ -665,7 +665,7 @@
           <a:p>
             <a:fld id="{FC1DA73A-530B-4180-8B42-735A1C2745EE}" type="datetimeFigureOut">
               <a:rPr lang="zh-CN" altLang="en-US" smtClean="0"/>
-              <a:t>2021/1/21</a:t>
+              <a:t>2021/2/2</a:t>
             </a:fld>
             <a:endParaRPr lang="zh-CN" altLang="en-US"/>
           </a:p>
@@ -863,7 +863,7 @@
           <a:p>
             <a:fld id="{FC1DA73A-530B-4180-8B42-735A1C2745EE}" type="datetimeFigureOut">
               <a:rPr lang="zh-CN" altLang="en-US" smtClean="0"/>
-              <a:t>2021/1/21</a:t>
+              <a:t>2021/2/2</a:t>
             </a:fld>
             <a:endParaRPr lang="zh-CN" altLang="en-US"/>
           </a:p>
@@ -1138,7 +1138,7 @@
           <a:p>
             <a:fld id="{FC1DA73A-530B-4180-8B42-735A1C2745EE}" type="datetimeFigureOut">
               <a:rPr lang="zh-CN" altLang="en-US" smtClean="0"/>
-              <a:t>2021/1/21</a:t>
+              <a:t>2021/2/2</a:t>
             </a:fld>
             <a:endParaRPr lang="zh-CN" altLang="en-US"/>
           </a:p>
@@ -1403,7 +1403,7 @@
           <a:p>
             <a:fld id="{FC1DA73A-530B-4180-8B42-735A1C2745EE}" type="datetimeFigureOut">
               <a:rPr lang="zh-CN" altLang="en-US" smtClean="0"/>
-              <a:t>2021/1/21</a:t>
+              <a:t>2021/2/2</a:t>
             </a:fld>
             <a:endParaRPr lang="zh-CN" altLang="en-US"/>
           </a:p>
@@ -1815,7 +1815,7 @@
           <a:p>
             <a:fld id="{FC1DA73A-530B-4180-8B42-735A1C2745EE}" type="datetimeFigureOut">
               <a:rPr lang="zh-CN" altLang="en-US" smtClean="0"/>
-              <a:t>2021/1/21</a:t>
+              <a:t>2021/2/2</a:t>
             </a:fld>
             <a:endParaRPr lang="zh-CN" altLang="en-US"/>
           </a:p>
@@ -1956,7 +1956,7 @@
           <a:p>
             <a:fld id="{FC1DA73A-530B-4180-8B42-735A1C2745EE}" type="datetimeFigureOut">
               <a:rPr lang="zh-CN" altLang="en-US" smtClean="0"/>
-              <a:t>2021/1/21</a:t>
+              <a:t>2021/2/2</a:t>
             </a:fld>
             <a:endParaRPr lang="zh-CN" altLang="en-US"/>
           </a:p>
@@ -2069,7 +2069,7 @@
           <a:p>
             <a:fld id="{FC1DA73A-530B-4180-8B42-735A1C2745EE}" type="datetimeFigureOut">
               <a:rPr lang="zh-CN" altLang="en-US" smtClean="0"/>
-              <a:t>2021/1/21</a:t>
+              <a:t>2021/2/2</a:t>
             </a:fld>
             <a:endParaRPr lang="zh-CN" altLang="en-US"/>
           </a:p>
@@ -2380,7 +2380,7 @@
           <a:p>
             <a:fld id="{FC1DA73A-530B-4180-8B42-735A1C2745EE}" type="datetimeFigureOut">
               <a:rPr lang="zh-CN" altLang="en-US" smtClean="0"/>
-              <a:t>2021/1/21</a:t>
+              <a:t>2021/2/2</a:t>
             </a:fld>
             <a:endParaRPr lang="zh-CN" altLang="en-US"/>
           </a:p>
@@ -2668,7 +2668,7 @@
           <a:p>
             <a:fld id="{FC1DA73A-530B-4180-8B42-735A1C2745EE}" type="datetimeFigureOut">
               <a:rPr lang="zh-CN" altLang="en-US" smtClean="0"/>
-              <a:t>2021/1/21</a:t>
+              <a:t>2021/2/2</a:t>
             </a:fld>
             <a:endParaRPr lang="zh-CN" altLang="en-US"/>
           </a:p>
@@ -2909,7 +2909,7 @@
           <a:p>
             <a:fld id="{FC1DA73A-530B-4180-8B42-735A1C2745EE}" type="datetimeFigureOut">
               <a:rPr lang="zh-CN" altLang="en-US" smtClean="0"/>
-              <a:t>2021/1/21</a:t>
+              <a:t>2021/2/2</a:t>
             </a:fld>
             <a:endParaRPr lang="zh-CN" altLang="en-US"/>
           </a:p>
@@ -3328,10 +3328,10 @@
       </p:grpSpPr>
       <p:sp>
         <p:nvSpPr>
-          <p:cNvPr id="4" name="矩形: 对角圆角 3">
-            <a:extLst>
-              <a:ext uri="{FF2B5EF4-FFF2-40B4-BE49-F238E27FC236}">
-                <a16:creationId xmlns:a16="http://schemas.microsoft.com/office/drawing/2014/main" id="{2AF13FA5-A064-4FB2-B869-2DD53971893D}"/>
+          <p:cNvPr id="11" name="任意多边形: 形状 10">
+            <a:extLst>
+              <a:ext uri="{FF2B5EF4-FFF2-40B4-BE49-F238E27FC236}">
+                <a16:creationId xmlns:a16="http://schemas.microsoft.com/office/drawing/2014/main" id="{14472AA4-4A9F-4576-85FE-75CA1289EB3C}"/>
               </a:ext>
             </a:extLst>
           </p:cNvPr>
@@ -3340,15 +3340,110 @@
         </p:nvSpPr>
         <p:spPr>
           <a:xfrm rot="2700000">
-            <a:off x="106118" y="2964543"/>
-            <a:ext cx="4412939" cy="928915"/>
+            <a:off x="106117" y="2964543"/>
+            <a:ext cx="4412940" cy="928915"/>
           </a:xfrm>
-          <a:prstGeom prst="round2DiagRect">
-            <a:avLst>
-              <a:gd name="adj1" fmla="val 0"/>
-              <a:gd name="adj2" fmla="val 50000"/>
-            </a:avLst>
-          </a:prstGeom>
+          <a:custGeom>
+            <a:avLst/>
+            <a:gdLst>
+              <a:gd name="connsiteX0" fmla="*/ 3287691 w 4412940"/>
+              <a:gd name="connsiteY0" fmla="*/ 0 h 928915"/>
+              <a:gd name="connsiteX1" fmla="*/ 3948482 w 4412940"/>
+              <a:gd name="connsiteY1" fmla="*/ 0 h 928915"/>
+              <a:gd name="connsiteX2" fmla="*/ 4412940 w 4412940"/>
+              <a:gd name="connsiteY2" fmla="*/ 464458 h 928915"/>
+              <a:gd name="connsiteX3" fmla="*/ 4412939 w 4412940"/>
+              <a:gd name="connsiteY3" fmla="*/ 928915 h 928915"/>
+              <a:gd name="connsiteX4" fmla="*/ 3287691 w 4412940"/>
+              <a:gd name="connsiteY4" fmla="*/ 928915 h 928915"/>
+              <a:gd name="connsiteX5" fmla="*/ 0 w 4412940"/>
+              <a:gd name="connsiteY5" fmla="*/ 0 h 928915"/>
+              <a:gd name="connsiteX6" fmla="*/ 2785418 w 4412940"/>
+              <a:gd name="connsiteY6" fmla="*/ 0 h 928915"/>
+              <a:gd name="connsiteX7" fmla="*/ 2785418 w 4412940"/>
+              <a:gd name="connsiteY7" fmla="*/ 928915 h 928915"/>
+              <a:gd name="connsiteX8" fmla="*/ 464458 w 4412940"/>
+              <a:gd name="connsiteY8" fmla="*/ 928915 h 928915"/>
+              <a:gd name="connsiteX9" fmla="*/ 0 w 4412940"/>
+              <a:gd name="connsiteY9" fmla="*/ 464457 h 928915"/>
+            </a:gdLst>
+            <a:ahLst/>
+            <a:cxnLst>
+              <a:cxn ang="0">
+                <a:pos x="connsiteX0" y="connsiteY0"/>
+              </a:cxn>
+              <a:cxn ang="0">
+                <a:pos x="connsiteX1" y="connsiteY1"/>
+              </a:cxn>
+              <a:cxn ang="0">
+                <a:pos x="connsiteX2" y="connsiteY2"/>
+              </a:cxn>
+              <a:cxn ang="0">
+                <a:pos x="connsiteX3" y="connsiteY3"/>
+              </a:cxn>
+              <a:cxn ang="0">
+                <a:pos x="connsiteX4" y="connsiteY4"/>
+              </a:cxn>
+              <a:cxn ang="0">
+                <a:pos x="connsiteX5" y="connsiteY5"/>
+              </a:cxn>
+              <a:cxn ang="0">
+                <a:pos x="connsiteX6" y="connsiteY6"/>
+              </a:cxn>
+              <a:cxn ang="0">
+                <a:pos x="connsiteX7" y="connsiteY7"/>
+              </a:cxn>
+              <a:cxn ang="0">
+                <a:pos x="connsiteX8" y="connsiteY8"/>
+              </a:cxn>
+              <a:cxn ang="0">
+                <a:pos x="connsiteX9" y="connsiteY9"/>
+              </a:cxn>
+            </a:cxnLst>
+            <a:rect l="l" t="t" r="r" b="b"/>
+            <a:pathLst>
+              <a:path w="4412940" h="928915">
+                <a:moveTo>
+                  <a:pt x="3287691" y="0"/>
+                </a:moveTo>
+                <a:lnTo>
+                  <a:pt x="3948482" y="0"/>
+                </a:lnTo>
+                <a:cubicBezTo>
+                  <a:pt x="4204995" y="0"/>
+                  <a:pt x="4412940" y="207945"/>
+                  <a:pt x="4412940" y="464458"/>
+                </a:cubicBezTo>
+                <a:cubicBezTo>
+                  <a:pt x="4412940" y="619277"/>
+                  <a:pt x="4412939" y="774096"/>
+                  <a:pt x="4412939" y="928915"/>
+                </a:cubicBezTo>
+                <a:lnTo>
+                  <a:pt x="3287691" y="928915"/>
+                </a:lnTo>
+                <a:close/>
+                <a:moveTo>
+                  <a:pt x="0" y="0"/>
+                </a:moveTo>
+                <a:lnTo>
+                  <a:pt x="2785418" y="0"/>
+                </a:lnTo>
+                <a:lnTo>
+                  <a:pt x="2785418" y="928915"/>
+                </a:lnTo>
+                <a:lnTo>
+                  <a:pt x="464458" y="928915"/>
+                </a:lnTo>
+                <a:cubicBezTo>
+                  <a:pt x="207945" y="928915"/>
+                  <a:pt x="0" y="720970"/>
+                  <a:pt x="0" y="464457"/>
+                </a:cubicBezTo>
+                <a:close/>
+              </a:path>
+            </a:pathLst>
+          </a:custGeom>
           <a:solidFill>
             <a:schemeClr val="accent1">
               <a:lumMod val="75000"/>
@@ -3375,7 +3470,9 @@
           </a:fontRef>
         </p:style>
         <p:txBody>
-          <a:bodyPr rtlCol="0" anchor="ctr"/>
+          <a:bodyPr wrap="square" rtlCol="0" anchor="ctr">
+            <a:noAutofit/>
+          </a:bodyPr>
           <a:lstStyle/>
           <a:p>
             <a:pPr algn="ctr"/>
@@ -3595,61 +3692,6 @@
               <a:latin typeface="Candara Light" panose="020E0502030303020204" pitchFamily="34" charset="0"/>
               <a:ea typeface="微软雅黑 Light" panose="020B0502040204020203" pitchFamily="34" charset="-122"/>
             </a:endParaRPr>
-          </a:p>
-        </p:txBody>
-      </p:sp>
-      <p:sp>
-        <p:nvSpPr>
-          <p:cNvPr id="9" name="矩形: 对角圆角 8">
-            <a:extLst>
-              <a:ext uri="{FF2B5EF4-FFF2-40B4-BE49-F238E27FC236}">
-                <a16:creationId xmlns:a16="http://schemas.microsoft.com/office/drawing/2014/main" id="{BCED7407-7395-4030-B580-BC8820764F81}"/>
-              </a:ext>
-            </a:extLst>
-          </p:cNvPr>
-          <p:cNvSpPr/>
-          <p:nvPr/>
-        </p:nvSpPr>
-        <p:spPr>
-          <a:xfrm rot="8100000" flipV="1">
-            <a:off x="2250658" y="3789623"/>
-            <a:ext cx="1255181" cy="519098"/>
-          </a:xfrm>
-          <a:prstGeom prst="round2DiagRect">
-            <a:avLst>
-              <a:gd name="adj1" fmla="val 0"/>
-              <a:gd name="adj2" fmla="val 0"/>
-            </a:avLst>
-          </a:prstGeom>
-          <a:solidFill>
-            <a:schemeClr val="bg1"/>
-          </a:solidFill>
-          <a:ln>
-            <a:noFill/>
-          </a:ln>
-        </p:spPr>
-        <p:style>
-          <a:lnRef idx="2">
-            <a:schemeClr val="accent1">
-              <a:shade val="50000"/>
-            </a:schemeClr>
-          </a:lnRef>
-          <a:fillRef idx="1">
-            <a:schemeClr val="accent1"/>
-          </a:fillRef>
-          <a:effectRef idx="0">
-            <a:schemeClr val="accent1"/>
-          </a:effectRef>
-          <a:fontRef idx="minor">
-            <a:schemeClr val="lt1"/>
-          </a:fontRef>
-        </p:style>
-        <p:txBody>
-          <a:bodyPr rtlCol="0" anchor="ctr"/>
-          <a:lstStyle/>
-          <a:p>
-            <a:pPr algn="ctr"/>
-            <a:endParaRPr lang="zh-CN" altLang="en-US"/>
           </a:p>
         </p:txBody>
       </p:sp>

</xml_diff>